<commit_message>
Update CS3300 – Introduction to Software Engineering - Final.pptx
</commit_message>
<xml_diff>
--- a/docs/CS3300 – Introduction to Software Engineering - Final.pptx
+++ b/docs/CS3300 – Introduction to Software Engineering - Final.pptx
@@ -231,7 +231,7 @@
           <a:p>
             <a:fld id="{F8B5B181-1792-431A-B18A-2085692FD22C}" type="datetimeFigureOut">
               <a:rPr lang="en-US" smtClean="0"/>
-              <a:t>4/25/2025</a:t>
+              <a:t>4/27/2025</a:t>
             </a:fld>
             <a:endParaRPr lang="en-US"/>
           </a:p>
@@ -645,7 +645,7 @@
           <a:p>
             <a:fld id="{AD772B8A-C981-4167-97B2-9389764143AA}" type="datetimeFigureOut">
               <a:rPr lang="en-US" smtClean="0"/>
-              <a:t>4/25/2025</a:t>
+              <a:t>4/27/2025</a:t>
             </a:fld>
             <a:endParaRPr lang="en-US"/>
           </a:p>
@@ -843,7 +843,7 @@
           <a:p>
             <a:fld id="{AD772B8A-C981-4167-97B2-9389764143AA}" type="datetimeFigureOut">
               <a:rPr lang="en-US" smtClean="0"/>
-              <a:t>4/25/2025</a:t>
+              <a:t>4/27/2025</a:t>
             </a:fld>
             <a:endParaRPr lang="en-US"/>
           </a:p>
@@ -1051,7 +1051,7 @@
           <a:p>
             <a:fld id="{AD772B8A-C981-4167-97B2-9389764143AA}" type="datetimeFigureOut">
               <a:rPr lang="en-US" smtClean="0"/>
-              <a:t>4/25/2025</a:t>
+              <a:t>4/27/2025</a:t>
             </a:fld>
             <a:endParaRPr lang="en-US"/>
           </a:p>
@@ -1249,7 +1249,7 @@
           <a:p>
             <a:fld id="{AD772B8A-C981-4167-97B2-9389764143AA}" type="datetimeFigureOut">
               <a:rPr lang="en-US" smtClean="0"/>
-              <a:t>4/25/2025</a:t>
+              <a:t>4/27/2025</a:t>
             </a:fld>
             <a:endParaRPr lang="en-US"/>
           </a:p>
@@ -1524,7 +1524,7 @@
           <a:p>
             <a:fld id="{AD772B8A-C981-4167-97B2-9389764143AA}" type="datetimeFigureOut">
               <a:rPr lang="en-US" smtClean="0"/>
-              <a:t>4/25/2025</a:t>
+              <a:t>4/27/2025</a:t>
             </a:fld>
             <a:endParaRPr lang="en-US"/>
           </a:p>
@@ -1789,7 +1789,7 @@
           <a:p>
             <a:fld id="{AD772B8A-C981-4167-97B2-9389764143AA}" type="datetimeFigureOut">
               <a:rPr lang="en-US" smtClean="0"/>
-              <a:t>4/25/2025</a:t>
+              <a:t>4/27/2025</a:t>
             </a:fld>
             <a:endParaRPr lang="en-US"/>
           </a:p>
@@ -2201,7 +2201,7 @@
           <a:p>
             <a:fld id="{AD772B8A-C981-4167-97B2-9389764143AA}" type="datetimeFigureOut">
               <a:rPr lang="en-US" smtClean="0"/>
-              <a:t>4/25/2025</a:t>
+              <a:t>4/27/2025</a:t>
             </a:fld>
             <a:endParaRPr lang="en-US"/>
           </a:p>
@@ -2342,7 +2342,7 @@
           <a:p>
             <a:fld id="{AD772B8A-C981-4167-97B2-9389764143AA}" type="datetimeFigureOut">
               <a:rPr lang="en-US" smtClean="0"/>
-              <a:t>4/25/2025</a:t>
+              <a:t>4/27/2025</a:t>
             </a:fld>
             <a:endParaRPr lang="en-US"/>
           </a:p>
@@ -2769,7 +2769,7 @@
           <a:p>
             <a:fld id="{AD772B8A-C981-4167-97B2-9389764143AA}" type="datetimeFigureOut">
               <a:rPr lang="en-US" smtClean="0"/>
-              <a:t>4/25/2025</a:t>
+              <a:t>4/27/2025</a:t>
             </a:fld>
             <a:endParaRPr lang="en-US"/>
           </a:p>
@@ -3057,7 +3057,7 @@
           <a:p>
             <a:fld id="{AD772B8A-C981-4167-97B2-9389764143AA}" type="datetimeFigureOut">
               <a:rPr lang="en-US" smtClean="0"/>
-              <a:t>4/25/2025</a:t>
+              <a:t>4/27/2025</a:t>
             </a:fld>
             <a:endParaRPr lang="en-US"/>
           </a:p>
@@ -4822,10 +4822,10 @@
       </p:sp>
       <p:pic>
         <p:nvPicPr>
-          <p:cNvPr id="12" name="Picture 11" descr="A diagram of a company&#10;&#10;AI-generated content may be incorrect.">
-            <a:extLst>
-              <a:ext uri="{FF2B5EF4-FFF2-40B4-BE49-F238E27FC236}">
-                <a16:creationId xmlns:a16="http://schemas.microsoft.com/office/drawing/2014/main" id="{54292CBC-D113-8091-096F-1E79579176FD}"/>
+          <p:cNvPr id="6" name="Picture 5" descr="A diagram of a company&#10;&#10;AI-generated content may be incorrect.">
+            <a:extLst>
+              <a:ext uri="{FF2B5EF4-FFF2-40B4-BE49-F238E27FC236}">
+                <a16:creationId xmlns:a16="http://schemas.microsoft.com/office/drawing/2014/main" id="{1AEF83E9-E76E-7046-DFCB-B623CF5C5860}"/>
               </a:ext>
             </a:extLst>
           </p:cNvPr>
@@ -4848,8 +4848,8 @@
         </p:blipFill>
         <p:spPr>
           <a:xfrm>
-            <a:off x="-1" y="635000"/>
-            <a:ext cx="12192000" cy="5588000"/>
+            <a:off x="0" y="717176"/>
+            <a:ext cx="12192000" cy="5423647"/>
           </a:xfrm>
           <a:prstGeom prst="rect">
             <a:avLst/>
@@ -6439,20 +6439,20 @@
 </file>
 
 <file path=customXml/item2.xml><?xml version="1.0" encoding="utf-8"?>
+<p:properties xmlns:p="http://schemas.microsoft.com/office/2006/metadata/properties" xmlns:xsi="http://www.w3.org/2001/XMLSchema-instance" xmlns:pc="http://schemas.microsoft.com/office/infopath/2007/PartnerControls">
+  <documentManagement>
+    <_activity xmlns="13ff1bab-4769-433b-887e-aafb5391e712" xsi:nil="true"/>
+  </documentManagement>
+</p:properties>
+</file>
+
+<file path=customXml/item3.xml><?xml version="1.0" encoding="utf-8"?>
 <?mso-contentType ?>
 <FormTemplates xmlns="http://schemas.microsoft.com/sharepoint/v3/contenttype/forms">
   <Display>DocumentLibraryForm</Display>
   <Edit>DocumentLibraryForm</Edit>
   <New>DocumentLibraryForm</New>
 </FormTemplates>
-</file>
-
-<file path=customXml/item3.xml><?xml version="1.0" encoding="utf-8"?>
-<p:properties xmlns:p="http://schemas.microsoft.com/office/2006/metadata/properties" xmlns:xsi="http://www.w3.org/2001/XMLSchema-instance" xmlns:pc="http://schemas.microsoft.com/office/infopath/2007/PartnerControls">
-  <documentManagement>
-    <_activity xmlns="13ff1bab-4769-433b-887e-aafb5391e712" xsi:nil="true"/>
-  </documentManagement>
-</p:properties>
 </file>
 
 <file path=customXml/itemProps1.xml><?xml version="1.0" encoding="utf-8"?>
@@ -6475,14 +6475,6 @@
 </file>
 
 <file path=customXml/itemProps2.xml><?xml version="1.0" encoding="utf-8"?>
-<ds:datastoreItem xmlns:ds="http://schemas.openxmlformats.org/officeDocument/2006/customXml" ds:itemID="{07D81689-5A9E-4B2F-99F3-AD6CFA2AE90B}">
-  <ds:schemaRefs>
-    <ds:schemaRef ds:uri="http://schemas.microsoft.com/sharepoint/v3/contenttype/forms"/>
-  </ds:schemaRefs>
-</ds:datastoreItem>
-</file>
-
-<file path=customXml/itemProps3.xml><?xml version="1.0" encoding="utf-8"?>
 <ds:datastoreItem xmlns:ds="http://schemas.openxmlformats.org/officeDocument/2006/customXml" ds:itemID="{43C57BCB-4048-4813-9E3A-7B9B126D99DF}">
   <ds:schemaRefs>
     <ds:schemaRef ds:uri="13ff1bab-4769-433b-887e-aafb5391e712"/>
@@ -6497,4 +6489,12 @@
     <ds:schemaRef ds:uri="http://www.w3.org/XML/1998/namespace"/>
   </ds:schemaRefs>
 </ds:datastoreItem>
+</file>
+
+<file path=customXml/itemProps3.xml><?xml version="1.0" encoding="utf-8"?>
+<ds:datastoreItem xmlns:ds="http://schemas.openxmlformats.org/officeDocument/2006/customXml" ds:itemID="{07D81689-5A9E-4B2F-99F3-AD6CFA2AE90B}">
+  <ds:schemaRefs>
+    <ds:schemaRef ds:uri="http://schemas.microsoft.com/sharepoint/v3/contenttype/forms"/>
+  </ds:schemaRefs>
+</ds:datastoreItem>
 </file>
</xml_diff>